<commit_message>
Porfavor no mas cambios
</commit_message>
<xml_diff>
--- a/public/Presentacion_Proyecto.pptx
+++ b/public/Presentacion_Proyecto.pptx
@@ -69,7 +69,7 @@
         <p:txBody>
           <a:bodyPr/>
           <a:p>
-            <a:fld id="{4E62056D-7E31-4D7F-AD1D-4D43F242010D}" type="slidenum">
+            <a:fld id="{852089CC-F9CA-4377-8F66-DF320F8C2C85}" type="slidenum">
               <a:t>&lt;#&gt;</a:t>
             </a:fld>
           </a:p>
@@ -257,7 +257,7 @@
         <p:txBody>
           <a:bodyPr/>
           <a:p>
-            <a:fld id="{9FCD9236-37BE-4240-B756-C6B0F5292B05}" type="slidenum">
+            <a:fld id="{368F782C-9F2A-4F8A-92C7-0C4B8618F9A5}" type="slidenum">
               <a:t>&lt;#&gt;</a:t>
             </a:fld>
           </a:p>
@@ -513,7 +513,7 @@
         <p:txBody>
           <a:bodyPr/>
           <a:p>
-            <a:fld id="{9DED74A0-F630-4DC9-84D5-7194AB4488F8}" type="slidenum">
+            <a:fld id="{B90CFBA5-00AF-43A4-894D-83FA119EABB9}" type="slidenum">
               <a:t>&lt;#&gt;</a:t>
             </a:fld>
           </a:p>
@@ -837,7 +837,7 @@
         <p:txBody>
           <a:bodyPr/>
           <a:p>
-            <a:fld id="{6A8BE461-7C58-4792-83B6-0A0E8B2AD262}" type="slidenum">
+            <a:fld id="{45EC6BDB-2D9C-48AB-B717-18A3A8D9EFD7}" type="slidenum">
               <a:t>&lt;#&gt;</a:t>
             </a:fld>
           </a:p>
@@ -994,7 +994,7 @@
         <p:txBody>
           <a:bodyPr/>
           <a:p>
-            <a:fld id="{A5A0EFDA-AAFC-486F-A600-8B1859EC9C53}" type="slidenum">
+            <a:fld id="{509BFF60-0D9D-4011-BD6A-3E3DD7C9A986}" type="slidenum">
               <a:t>&lt;#&gt;</a:t>
             </a:fld>
           </a:p>
@@ -1148,7 +1148,7 @@
         <p:txBody>
           <a:bodyPr/>
           <a:p>
-            <a:fld id="{6CD1AEBE-9FD9-4AE0-B0CF-B1598C15C762}" type="slidenum">
+            <a:fld id="{33BF44F0-A94C-4730-B598-A01DA8F30D1A}" type="slidenum">
               <a:t>&lt;#&gt;</a:t>
             </a:fld>
           </a:p>
@@ -1336,7 +1336,7 @@
         <p:txBody>
           <a:bodyPr/>
           <a:p>
-            <a:fld id="{991FC812-7B62-4F03-93EE-1404E488BFB5}" type="slidenum">
+            <a:fld id="{B604E676-7847-494E-B8F2-5BCD4C824292}" type="slidenum">
               <a:t>&lt;#&gt;</a:t>
             </a:fld>
           </a:p>
@@ -1456,7 +1456,7 @@
         <p:txBody>
           <a:bodyPr/>
           <a:p>
-            <a:fld id="{D7B0C645-1569-4DD1-AD7F-23075243A846}" type="slidenum">
+            <a:fld id="{2032B7F8-C19D-42CE-9167-42D6B89E3217}" type="slidenum">
               <a:t>&lt;#&gt;</a:t>
             </a:fld>
           </a:p>
@@ -1576,7 +1576,7 @@
         <p:txBody>
           <a:bodyPr/>
           <a:p>
-            <a:fld id="{15BBBC4C-34FC-46DC-BCA9-C76F9BF1F430}" type="slidenum">
+            <a:fld id="{F78561E6-ABDD-4132-9DB2-69F1BE4159FB}" type="slidenum">
               <a:t>&lt;#&gt;</a:t>
             </a:fld>
           </a:p>
@@ -1798,7 +1798,7 @@
         <p:txBody>
           <a:bodyPr/>
           <a:p>
-            <a:fld id="{A43F825D-E876-4639-A787-757D85716E69}" type="slidenum">
+            <a:fld id="{7E883EAE-EB95-4775-A836-F34D33D85D9E}" type="slidenum">
               <a:t>&lt;#&gt;</a:t>
             </a:fld>
           </a:p>
@@ -2020,7 +2020,7 @@
         <p:txBody>
           <a:bodyPr/>
           <a:p>
-            <a:fld id="{EA4E13A1-DB36-4692-9CB0-CF3C35E3573C}" type="slidenum">
+            <a:fld id="{A26D9613-F821-44A0-A2AC-9C466A256445}" type="slidenum">
               <a:t>&lt;#&gt;</a:t>
             </a:fld>
           </a:p>
@@ -2242,7 +2242,7 @@
         <p:txBody>
           <a:bodyPr/>
           <a:p>
-            <a:fld id="{093464C9-8367-4FEB-9F8C-8E71D5CF02D5}" type="slidenum">
+            <a:fld id="{40AE392C-4CB6-4725-A4A7-D6C001433BB6}" type="slidenum">
               <a:t>&lt;#&gt;</a:t>
             </a:fld>
           </a:p>
@@ -2311,7 +2311,7 @@
         <p:spPr>
           <a:xfrm>
             <a:off x="3124080" y="6356520"/>
-            <a:ext cx="2894760" cy="364320"/>
+            <a:ext cx="2894040" cy="363600"/>
           </a:xfrm>
           <a:prstGeom prst="rect">
             <a:avLst/>
@@ -2368,7 +2368,7 @@
         <p:spPr>
           <a:xfrm>
             <a:off x="6553080" y="6356520"/>
-            <a:ext cx="2133000" cy="364320"/>
+            <a:ext cx="2132280" cy="363600"/>
           </a:xfrm>
           <a:prstGeom prst="rect">
             <a:avLst/>
@@ -2403,7 +2403,7 @@
               </a:lnSpc>
               <a:buNone/>
             </a:pPr>
-            <a:fld id="{E8DF6C4B-A682-463C-BEF8-32967AD3E7F2}" type="slidenum">
+            <a:fld id="{D9564BEF-6AD2-4246-84D3-72E063097299}" type="slidenum">
               <a:rPr b="0" lang="en-US" sz="1200" spc="-1" strike="noStrike">
                 <a:solidFill>
                   <a:srgbClr val="8b8b8b"/>
@@ -2431,7 +2431,7 @@
         <p:spPr>
           <a:xfrm>
             <a:off x="457200" y="6356520"/>
-            <a:ext cx="2133000" cy="364320"/>
+            <a:ext cx="2132280" cy="363600"/>
           </a:xfrm>
           <a:prstGeom prst="rect">
             <a:avLst/>
@@ -2744,7 +2744,7 @@
         <p:spPr>
           <a:xfrm>
             <a:off x="1058400" y="1828800"/>
-            <a:ext cx="7026480" cy="760320"/>
+            <a:ext cx="7025760" cy="759960"/>
           </a:xfrm>
           <a:prstGeom prst="rect">
             <a:avLst/>
@@ -2796,7 +2796,7 @@
         <p:spPr>
           <a:xfrm>
             <a:off x="1284480" y="3200400"/>
-            <a:ext cx="6573960" cy="455760"/>
+            <a:ext cx="6573240" cy="455400"/>
           </a:xfrm>
           <a:prstGeom prst="rect">
             <a:avLst/>
@@ -2885,7 +2885,7 @@
         <p:spPr>
           <a:xfrm>
             <a:off x="1947600" y="457200"/>
-            <a:ext cx="5248080" cy="760320"/>
+            <a:ext cx="5247360" cy="759960"/>
           </a:xfrm>
           <a:prstGeom prst="rect">
             <a:avLst/>
@@ -3121,7 +3121,7 @@
         <p:spPr>
           <a:xfrm>
             <a:off x="2601360" y="457200"/>
-            <a:ext cx="3940560" cy="760320"/>
+            <a:ext cx="3939840" cy="759960"/>
           </a:xfrm>
           <a:prstGeom prst="rect">
             <a:avLst/>
@@ -3367,7 +3367,7 @@
         <p:spPr>
           <a:xfrm>
             <a:off x="2160720" y="457200"/>
-            <a:ext cx="4821480" cy="760320"/>
+            <a:ext cx="4820760" cy="759960"/>
           </a:xfrm>
           <a:prstGeom prst="rect">
             <a:avLst/>
@@ -3419,7 +3419,7 @@
         <p:spPr>
           <a:xfrm>
             <a:off x="995040" y="1645920"/>
-            <a:ext cx="7153200" cy="1461600"/>
+            <a:ext cx="7152480" cy="1461240"/>
           </a:xfrm>
           <a:prstGeom prst="rect">
             <a:avLst/>
@@ -3561,7 +3561,7 @@
         <p:spPr>
           <a:xfrm>
             <a:off x="1783800" y="457200"/>
-            <a:ext cx="5575680" cy="760320"/>
+            <a:ext cx="5574960" cy="759960"/>
           </a:xfrm>
           <a:prstGeom prst="rect">
             <a:avLst/>
@@ -3613,7 +3613,7 @@
         <p:spPr>
           <a:xfrm>
             <a:off x="448200" y="1645920"/>
-            <a:ext cx="8247600" cy="1827360"/>
+            <a:ext cx="8247600" cy="1827000"/>
           </a:xfrm>
           <a:prstGeom prst="rect">
             <a:avLst/>
@@ -3776,7 +3776,7 @@
         <p:spPr>
           <a:xfrm>
             <a:off x="3216960" y="457200"/>
-            <a:ext cx="2709000" cy="760320"/>
+            <a:ext cx="2708280" cy="759960"/>
           </a:xfrm>
           <a:prstGeom prst="rect">
             <a:avLst/>
@@ -3828,7 +3828,7 @@
         <p:spPr>
           <a:xfrm>
             <a:off x="562320" y="1645920"/>
-            <a:ext cx="8019000" cy="1461600"/>
+            <a:ext cx="8019000" cy="1461240"/>
           </a:xfrm>
           <a:prstGeom prst="rect">
             <a:avLst/>
@@ -3970,7 +3970,7 @@
         <p:spPr>
           <a:xfrm>
             <a:off x="3210840" y="457200"/>
-            <a:ext cx="2723040" cy="760320"/>
+            <a:ext cx="2723040" cy="759960"/>
           </a:xfrm>
           <a:prstGeom prst="rect">
             <a:avLst/>
@@ -4022,7 +4022,7 @@
         <p:spPr>
           <a:xfrm>
             <a:off x="1463040" y="2160000"/>
-            <a:ext cx="1416600" cy="1095840"/>
+            <a:ext cx="1415880" cy="1095480"/>
           </a:xfrm>
           <a:prstGeom prst="rect">
             <a:avLst/>
@@ -4100,7 +4100,7 @@
         <p:spPr>
           <a:xfrm>
             <a:off x="3780000" y="1620000"/>
-            <a:ext cx="3239640" cy="2223360"/>
+            <a:ext cx="3238920" cy="2222640"/>
           </a:xfrm>
           <a:prstGeom prst="rect">
             <a:avLst/>

</xml_diff>